<commit_message>
change icons and links
</commit_message>
<xml_diff>
--- a/pictures.pptx
+++ b/pictures.pptx
@@ -244,7 +244,7 @@
           <a:p>
             <a:fld id="{65BDA79E-ECE0-4F78-BA93-E393AD04CE65}" type="datetimeFigureOut">
               <a:rPr lang="fr-CA" smtClean="0"/>
-              <a:t>2023-07-18</a:t>
+              <a:t>2023-07-19</a:t>
             </a:fld>
             <a:endParaRPr lang="fr-CA"/>
           </a:p>
@@ -414,7 +414,7 @@
           <a:p>
             <a:fld id="{65BDA79E-ECE0-4F78-BA93-E393AD04CE65}" type="datetimeFigureOut">
               <a:rPr lang="fr-CA" smtClean="0"/>
-              <a:t>2023-07-18</a:t>
+              <a:t>2023-07-19</a:t>
             </a:fld>
             <a:endParaRPr lang="fr-CA"/>
           </a:p>
@@ -594,7 +594,7 @@
           <a:p>
             <a:fld id="{65BDA79E-ECE0-4F78-BA93-E393AD04CE65}" type="datetimeFigureOut">
               <a:rPr lang="fr-CA" smtClean="0"/>
-              <a:t>2023-07-18</a:t>
+              <a:t>2023-07-19</a:t>
             </a:fld>
             <a:endParaRPr lang="fr-CA"/>
           </a:p>
@@ -764,7 +764,7 @@
           <a:p>
             <a:fld id="{65BDA79E-ECE0-4F78-BA93-E393AD04CE65}" type="datetimeFigureOut">
               <a:rPr lang="fr-CA" smtClean="0"/>
-              <a:t>2023-07-18</a:t>
+              <a:t>2023-07-19</a:t>
             </a:fld>
             <a:endParaRPr lang="fr-CA"/>
           </a:p>
@@ -1010,7 +1010,7 @@
           <a:p>
             <a:fld id="{65BDA79E-ECE0-4F78-BA93-E393AD04CE65}" type="datetimeFigureOut">
               <a:rPr lang="fr-CA" smtClean="0"/>
-              <a:t>2023-07-18</a:t>
+              <a:t>2023-07-19</a:t>
             </a:fld>
             <a:endParaRPr lang="fr-CA"/>
           </a:p>
@@ -1242,7 +1242,7 @@
           <a:p>
             <a:fld id="{65BDA79E-ECE0-4F78-BA93-E393AD04CE65}" type="datetimeFigureOut">
               <a:rPr lang="fr-CA" smtClean="0"/>
-              <a:t>2023-07-18</a:t>
+              <a:t>2023-07-19</a:t>
             </a:fld>
             <a:endParaRPr lang="fr-CA"/>
           </a:p>
@@ -1609,7 +1609,7 @@
           <a:p>
             <a:fld id="{65BDA79E-ECE0-4F78-BA93-E393AD04CE65}" type="datetimeFigureOut">
               <a:rPr lang="fr-CA" smtClean="0"/>
-              <a:t>2023-07-18</a:t>
+              <a:t>2023-07-19</a:t>
             </a:fld>
             <a:endParaRPr lang="fr-CA"/>
           </a:p>
@@ -1727,7 +1727,7 @@
           <a:p>
             <a:fld id="{65BDA79E-ECE0-4F78-BA93-E393AD04CE65}" type="datetimeFigureOut">
               <a:rPr lang="fr-CA" smtClean="0"/>
-              <a:t>2023-07-18</a:t>
+              <a:t>2023-07-19</a:t>
             </a:fld>
             <a:endParaRPr lang="fr-CA"/>
           </a:p>
@@ -1822,7 +1822,7 @@
           <a:p>
             <a:fld id="{65BDA79E-ECE0-4F78-BA93-E393AD04CE65}" type="datetimeFigureOut">
               <a:rPr lang="fr-CA" smtClean="0"/>
-              <a:t>2023-07-18</a:t>
+              <a:t>2023-07-19</a:t>
             </a:fld>
             <a:endParaRPr lang="fr-CA"/>
           </a:p>
@@ -2099,7 +2099,7 @@
           <a:p>
             <a:fld id="{65BDA79E-ECE0-4F78-BA93-E393AD04CE65}" type="datetimeFigureOut">
               <a:rPr lang="fr-CA" smtClean="0"/>
-              <a:t>2023-07-18</a:t>
+              <a:t>2023-07-19</a:t>
             </a:fld>
             <a:endParaRPr lang="fr-CA"/>
           </a:p>
@@ -2356,7 +2356,7 @@
           <a:p>
             <a:fld id="{65BDA79E-ECE0-4F78-BA93-E393AD04CE65}" type="datetimeFigureOut">
               <a:rPr lang="fr-CA" smtClean="0"/>
-              <a:t>2023-07-18</a:t>
+              <a:t>2023-07-19</a:t>
             </a:fld>
             <a:endParaRPr lang="fr-CA"/>
           </a:p>
@@ -2569,7 +2569,7 @@
           <a:p>
             <a:fld id="{65BDA79E-ECE0-4F78-BA93-E393AD04CE65}" type="datetimeFigureOut">
               <a:rPr lang="fr-CA" smtClean="0"/>
-              <a:t>2023-07-18</a:t>
+              <a:t>2023-07-19</a:t>
             </a:fld>
             <a:endParaRPr lang="fr-CA"/>
           </a:p>
@@ -3067,6 +3067,77 @@
           </a:p>
         </p:txBody>
       </p:sp>
+      <p:sp>
+        <p:nvSpPr>
+          <p:cNvPr id="2" name="Larme 1">
+            <a:extLst>
+              <a:ext uri="{FF2B5EF4-FFF2-40B4-BE49-F238E27FC236}">
+                <a16:creationId xmlns:a16="http://schemas.microsoft.com/office/drawing/2014/main" id="{4FEB8B90-FD80-C414-DB84-6096506E18FA}"/>
+              </a:ext>
+            </a:extLst>
+          </p:cNvPr>
+          <p:cNvSpPr/>
+          <p:nvPr/>
+        </p:nvSpPr>
+        <p:spPr>
+          <a:xfrm>
+            <a:off x="6096000" y="5208270"/>
+            <a:ext cx="306705" cy="175259"/>
+          </a:xfrm>
+          <a:prstGeom prst="teardrop">
+            <a:avLst>
+              <a:gd name="adj" fmla="val 74534"/>
+            </a:avLst>
+          </a:prstGeom>
+          <a:gradFill flip="none" rotWithShape="1">
+            <a:gsLst>
+              <a:gs pos="0">
+                <a:srgbClr val="6D7A9C"/>
+              </a:gs>
+              <a:gs pos="100000">
+                <a:srgbClr val="101421"/>
+              </a:gs>
+            </a:gsLst>
+            <a:lin ang="0" scaled="1"/>
+            <a:tileRect/>
+          </a:gradFill>
+          <a:ln>
+            <a:noFill/>
+          </a:ln>
+          <a:effectLst>
+            <a:innerShdw blurRad="63500" dist="50800" dir="16200000">
+              <a:prstClr val="black">
+                <a:alpha val="50000"/>
+              </a:prstClr>
+            </a:innerShdw>
+            <a:softEdge rad="12700"/>
+          </a:effectLst>
+        </p:spPr>
+        <p:style>
+          <a:lnRef idx="2">
+            <a:schemeClr val="accent1">
+              <a:shade val="50000"/>
+            </a:schemeClr>
+          </a:lnRef>
+          <a:fillRef idx="1">
+            <a:schemeClr val="accent1"/>
+          </a:fillRef>
+          <a:effectRef idx="0">
+            <a:schemeClr val="accent1"/>
+          </a:effectRef>
+          <a:fontRef idx="minor">
+            <a:schemeClr val="lt1"/>
+          </a:fontRef>
+        </p:style>
+        <p:txBody>
+          <a:bodyPr rtlCol="0" anchor="ctr"/>
+          <a:lstStyle/>
+          <a:p>
+            <a:pPr algn="ctr"/>
+            <a:endParaRPr lang="fr-CA"/>
+          </a:p>
+        </p:txBody>
+      </p:sp>
     </p:spTree>
     <p:extLst>
       <p:ext uri="{BB962C8B-B14F-4D97-AF65-F5344CB8AC3E}">

</xml_diff>

<commit_message>
change published figures layout
</commit_message>
<xml_diff>
--- a/pictures.pptx
+++ b/pictures.pptx
@@ -3045,9 +3045,6 @@
             <a:pPr algn="ctr"/>
             <a:r>
               <a:rPr lang="fr-CA" sz="900" i="0" dirty="0">
-                <a:solidFill>
-                  <a:schemeClr val="bg1"/>
-                </a:solidFill>
                 <a:effectLst/>
                 <a:latin typeface="Arial" panose="020B0604020202020204" pitchFamily="34" charset="0"/>
                 <a:cs typeface="Arial" panose="020B0604020202020204" pitchFamily="34" charset="0"/>
@@ -3056,9 +3053,6 @@
             </a:r>
             <a:r>
               <a:rPr lang="fr-CA" sz="900" dirty="0">
-                <a:solidFill>
-                  <a:schemeClr val="bg1"/>
-                </a:solidFill>
                 <a:latin typeface="Arial" panose="020B0604020202020204" pitchFamily="34" charset="0"/>
                 <a:cs typeface="Arial" panose="020B0604020202020204" pitchFamily="34" charset="0"/>
               </a:rPr>

</xml_diff>

<commit_message>
add network coherence preprint
</commit_message>
<xml_diff>
--- a/pictures.pptx
+++ b/pictures.pptx
@@ -7,6 +7,7 @@
   <p:sldIdLst>
     <p:sldId id="256" r:id="rId2"/>
     <p:sldId id="257" r:id="rId3"/>
+    <p:sldId id="258" r:id="rId4"/>
   </p:sldIdLst>
   <p:sldSz cx="12192000" cy="6858000"/>
   <p:notesSz cx="6858000" cy="9144000"/>
@@ -113,6 +114,67 @@
 </p:presentation>
 </file>
 
+<file path=ppt/revisionInfo.xml><?xml version="1.0" encoding="utf-8"?>
+<p1510:revInfo xmlns:a="http://schemas.openxmlformats.org/drawingml/2006/main" xmlns:r="http://schemas.openxmlformats.org/officeDocument/2006/relationships" xmlns:p1510="http://schemas.microsoft.com/office/powerpoint/2015/10/main">
+  <p1510:revLst>
+    <p1510:client id="{8352072F-4929-4E63-9D34-A2A1D6459320}" v="3" dt="2025-11-08T02:42:17.392"/>
+  </p1510:revLst>
+</p1510:revInfo>
+</file>
+
+<file path=ppt/changesInfos/changesInfo1.xml><?xml version="1.0" encoding="utf-8"?>
+<pc:chgInfo xmlns:a="http://schemas.openxmlformats.org/drawingml/2006/main" xmlns:r="http://schemas.openxmlformats.org/officeDocument/2006/relationships" xmlns:ac="http://schemas.microsoft.com/office/drawing/2013/main/command" xmlns:pc="http://schemas.microsoft.com/office/powerpoint/2013/main/command">
+  <pc:docChgLst>
+    <pc:chgData name="Francis Banville" userId="8be915f0-3f0a-4a05-97c3-f4d9790eab96" providerId="ADAL" clId="{BC601F08-1BDA-4126-AE0C-DFD186A5B83B}"/>
+    <pc:docChg chg="custSel addSld modSld">
+      <pc:chgData name="Francis Banville" userId="8be915f0-3f0a-4a05-97c3-f4d9790eab96" providerId="ADAL" clId="{BC601F08-1BDA-4126-AE0C-DFD186A5B83B}" dt="2025-11-08T02:42:28.683" v="14" actId="1076"/>
+      <pc:docMkLst>
+        <pc:docMk/>
+      </pc:docMkLst>
+      <pc:sldChg chg="addSp delSp modSp new mod setBg">
+        <pc:chgData name="Francis Banville" userId="8be915f0-3f0a-4a05-97c3-f4d9790eab96" providerId="ADAL" clId="{BC601F08-1BDA-4126-AE0C-DFD186A5B83B}" dt="2025-11-08T02:42:28.683" v="14" actId="1076"/>
+        <pc:sldMkLst>
+          <pc:docMk/>
+          <pc:sldMk cId="2550920875" sldId="258"/>
+        </pc:sldMkLst>
+        <pc:spChg chg="del">
+          <ac:chgData name="Francis Banville" userId="8be915f0-3f0a-4a05-97c3-f4d9790eab96" providerId="ADAL" clId="{BC601F08-1BDA-4126-AE0C-DFD186A5B83B}" dt="2025-11-08T02:41:09.849" v="1" actId="478"/>
+          <ac:spMkLst>
+            <pc:docMk/>
+            <pc:sldMk cId="2550920875" sldId="258"/>
+            <ac:spMk id="2" creationId="{43D354C1-A169-F29F-72F8-CFC7AE93B00A}"/>
+          </ac:spMkLst>
+        </pc:spChg>
+        <pc:spChg chg="del">
+          <ac:chgData name="Francis Banville" userId="8be915f0-3f0a-4a05-97c3-f4d9790eab96" providerId="ADAL" clId="{BC601F08-1BDA-4126-AE0C-DFD186A5B83B}" dt="2025-11-08T02:41:11.529" v="2" actId="478"/>
+          <ac:spMkLst>
+            <pc:docMk/>
+            <pc:sldMk cId="2550920875" sldId="258"/>
+            <ac:spMk id="3" creationId="{789E047E-6CAE-6E78-B2C7-47F995005379}"/>
+          </ac:spMkLst>
+        </pc:spChg>
+        <pc:picChg chg="add mod">
+          <ac:chgData name="Francis Banville" userId="8be915f0-3f0a-4a05-97c3-f4d9790eab96" providerId="ADAL" clId="{BC601F08-1BDA-4126-AE0C-DFD186A5B83B}" dt="2025-11-08T02:42:04.003" v="6" actId="962"/>
+          <ac:picMkLst>
+            <pc:docMk/>
+            <pc:sldMk cId="2550920875" sldId="258"/>
+            <ac:picMk id="5" creationId="{676BEA68-3ED2-C0CE-3EFF-F13CB28D4093}"/>
+          </ac:picMkLst>
+        </pc:picChg>
+        <pc:picChg chg="add mod">
+          <ac:chgData name="Francis Banville" userId="8be915f0-3f0a-4a05-97c3-f4d9790eab96" providerId="ADAL" clId="{BC601F08-1BDA-4126-AE0C-DFD186A5B83B}" dt="2025-11-08T02:42:28.683" v="14" actId="1076"/>
+          <ac:picMkLst>
+            <pc:docMk/>
+            <pc:sldMk cId="2550920875" sldId="258"/>
+            <ac:picMk id="7" creationId="{FE377E59-7242-63CC-02BF-6C5F7ABD8146}"/>
+          </ac:picMkLst>
+        </pc:picChg>
+      </pc:sldChg>
+    </pc:docChg>
+  </pc:docChgLst>
+</pc:chgInfo>
+</file>
+
 <file path=ppt/slideLayouts/slideLayout1.xml><?xml version="1.0" encoding="utf-8"?>
 <p:sldLayout xmlns:a="http://schemas.openxmlformats.org/drawingml/2006/main" xmlns:r="http://schemas.openxmlformats.org/officeDocument/2006/relationships" xmlns:p="http://schemas.openxmlformats.org/presentationml/2006/main" type="title" preserve="1">
   <p:cSld name="Diapositive de titre">
@@ -244,7 +306,7 @@
           <a:p>
             <a:fld id="{65BDA79E-ECE0-4F78-BA93-E393AD04CE65}" type="datetimeFigureOut">
               <a:rPr lang="fr-CA" smtClean="0"/>
-              <a:t>2023-07-19</a:t>
+              <a:t>2025-11-07</a:t>
             </a:fld>
             <a:endParaRPr lang="fr-CA"/>
           </a:p>
@@ -414,7 +476,7 @@
           <a:p>
             <a:fld id="{65BDA79E-ECE0-4F78-BA93-E393AD04CE65}" type="datetimeFigureOut">
               <a:rPr lang="fr-CA" smtClean="0"/>
-              <a:t>2023-07-19</a:t>
+              <a:t>2025-11-07</a:t>
             </a:fld>
             <a:endParaRPr lang="fr-CA"/>
           </a:p>
@@ -594,7 +656,7 @@
           <a:p>
             <a:fld id="{65BDA79E-ECE0-4F78-BA93-E393AD04CE65}" type="datetimeFigureOut">
               <a:rPr lang="fr-CA" smtClean="0"/>
-              <a:t>2023-07-19</a:t>
+              <a:t>2025-11-07</a:t>
             </a:fld>
             <a:endParaRPr lang="fr-CA"/>
           </a:p>
@@ -764,7 +826,7 @@
           <a:p>
             <a:fld id="{65BDA79E-ECE0-4F78-BA93-E393AD04CE65}" type="datetimeFigureOut">
               <a:rPr lang="fr-CA" smtClean="0"/>
-              <a:t>2023-07-19</a:t>
+              <a:t>2025-11-07</a:t>
             </a:fld>
             <a:endParaRPr lang="fr-CA"/>
           </a:p>
@@ -1010,7 +1072,7 @@
           <a:p>
             <a:fld id="{65BDA79E-ECE0-4F78-BA93-E393AD04CE65}" type="datetimeFigureOut">
               <a:rPr lang="fr-CA" smtClean="0"/>
-              <a:t>2023-07-19</a:t>
+              <a:t>2025-11-07</a:t>
             </a:fld>
             <a:endParaRPr lang="fr-CA"/>
           </a:p>
@@ -1242,7 +1304,7 @@
           <a:p>
             <a:fld id="{65BDA79E-ECE0-4F78-BA93-E393AD04CE65}" type="datetimeFigureOut">
               <a:rPr lang="fr-CA" smtClean="0"/>
-              <a:t>2023-07-19</a:t>
+              <a:t>2025-11-07</a:t>
             </a:fld>
             <a:endParaRPr lang="fr-CA"/>
           </a:p>
@@ -1609,7 +1671,7 @@
           <a:p>
             <a:fld id="{65BDA79E-ECE0-4F78-BA93-E393AD04CE65}" type="datetimeFigureOut">
               <a:rPr lang="fr-CA" smtClean="0"/>
-              <a:t>2023-07-19</a:t>
+              <a:t>2025-11-07</a:t>
             </a:fld>
             <a:endParaRPr lang="fr-CA"/>
           </a:p>
@@ -1727,7 +1789,7 @@
           <a:p>
             <a:fld id="{65BDA79E-ECE0-4F78-BA93-E393AD04CE65}" type="datetimeFigureOut">
               <a:rPr lang="fr-CA" smtClean="0"/>
-              <a:t>2023-07-19</a:t>
+              <a:t>2025-11-07</a:t>
             </a:fld>
             <a:endParaRPr lang="fr-CA"/>
           </a:p>
@@ -1822,7 +1884,7 @@
           <a:p>
             <a:fld id="{65BDA79E-ECE0-4F78-BA93-E393AD04CE65}" type="datetimeFigureOut">
               <a:rPr lang="fr-CA" smtClean="0"/>
-              <a:t>2023-07-19</a:t>
+              <a:t>2025-11-07</a:t>
             </a:fld>
             <a:endParaRPr lang="fr-CA"/>
           </a:p>
@@ -2099,7 +2161,7 @@
           <a:p>
             <a:fld id="{65BDA79E-ECE0-4F78-BA93-E393AD04CE65}" type="datetimeFigureOut">
               <a:rPr lang="fr-CA" smtClean="0"/>
-              <a:t>2023-07-19</a:t>
+              <a:t>2025-11-07</a:t>
             </a:fld>
             <a:endParaRPr lang="fr-CA"/>
           </a:p>
@@ -2356,7 +2418,7 @@
           <a:p>
             <a:fld id="{65BDA79E-ECE0-4F78-BA93-E393AD04CE65}" type="datetimeFigureOut">
               <a:rPr lang="fr-CA" smtClean="0"/>
-              <a:t>2023-07-19</a:t>
+              <a:t>2025-11-07</a:t>
             </a:fld>
             <a:endParaRPr lang="fr-CA"/>
           </a:p>
@@ -2569,7 +2631,7 @@
           <a:p>
             <a:fld id="{65BDA79E-ECE0-4F78-BA93-E393AD04CE65}" type="datetimeFigureOut">
               <a:rPr lang="fr-CA" smtClean="0"/>
-              <a:t>2023-07-19</a:t>
+              <a:t>2025-11-07</a:t>
             </a:fld>
             <a:endParaRPr lang="fr-CA"/>
           </a:p>
@@ -3271,6 +3333,116 @@
 </p:sld>
 </file>
 
+<file path=ppt/slides/slide3.xml><?xml version="1.0" encoding="utf-8"?>
+<p:sld xmlns:a="http://schemas.openxmlformats.org/drawingml/2006/main" xmlns:r="http://schemas.openxmlformats.org/officeDocument/2006/relationships" xmlns:p="http://schemas.openxmlformats.org/presentationml/2006/main">
+  <p:cSld>
+    <p:bg>
+      <p:bgPr>
+        <a:solidFill>
+          <a:schemeClr val="tx1"/>
+        </a:solidFill>
+        <a:effectLst/>
+      </p:bgPr>
+    </p:bg>
+    <p:spTree>
+      <p:nvGrpSpPr>
+        <p:cNvPr id="1" name=""/>
+        <p:cNvGrpSpPr/>
+        <p:nvPr/>
+      </p:nvGrpSpPr>
+      <p:grpSpPr>
+        <a:xfrm>
+          <a:off x="0" y="0"/>
+          <a:ext cx="0" cy="0"/>
+          <a:chOff x="0" y="0"/>
+          <a:chExt cx="0" cy="0"/>
+        </a:xfrm>
+      </p:grpSpPr>
+      <p:pic>
+        <p:nvPicPr>
+          <p:cNvPr id="5" name="Image 4" descr="Une image contenant croquis, dessin, art, illustration&#10;&#10;Le contenu généré par l’IA peut être incorrect.">
+            <a:extLst>
+              <a:ext uri="{FF2B5EF4-FFF2-40B4-BE49-F238E27FC236}">
+                <a16:creationId xmlns:a16="http://schemas.microsoft.com/office/drawing/2014/main" id="{676BEA68-3ED2-C0CE-3EFF-F13CB28D4093}"/>
+              </a:ext>
+            </a:extLst>
+          </p:cNvPr>
+          <p:cNvPicPr>
+            <a:picLocks noChangeAspect="1"/>
+          </p:cNvPicPr>
+          <p:nvPr/>
+        </p:nvPicPr>
+        <p:blipFill>
+          <a:blip r:embed="rId2">
+            <a:extLst>
+              <a:ext uri="{28A0092B-C50C-407E-A947-70E740481C1C}">
+                <a14:useLocalDpi xmlns:a14="http://schemas.microsoft.com/office/drawing/2010/main" val="0"/>
+              </a:ext>
+            </a:extLst>
+          </a:blip>
+          <a:stretch>
+            <a:fillRect/>
+          </a:stretch>
+        </p:blipFill>
+        <p:spPr>
+          <a:xfrm>
+            <a:off x="1799663" y="1223335"/>
+            <a:ext cx="8592673" cy="4411330"/>
+          </a:xfrm>
+          <a:prstGeom prst="rect">
+            <a:avLst/>
+          </a:prstGeom>
+        </p:spPr>
+      </p:pic>
+      <p:pic>
+        <p:nvPicPr>
+          <p:cNvPr id="7" name="Image 6" descr="Une image contenant diagramme, texte, capture d’écran, Tracé&#10;&#10;Le contenu généré par l’IA peut être incorrect.">
+            <a:extLst>
+              <a:ext uri="{FF2B5EF4-FFF2-40B4-BE49-F238E27FC236}">
+                <a16:creationId xmlns:a16="http://schemas.microsoft.com/office/drawing/2014/main" id="{FE377E59-7242-63CC-02BF-6C5F7ABD8146}"/>
+              </a:ext>
+            </a:extLst>
+          </p:cNvPr>
+          <p:cNvPicPr>
+            <a:picLocks noChangeAspect="1"/>
+          </p:cNvPicPr>
+          <p:nvPr/>
+        </p:nvPicPr>
+        <p:blipFill>
+          <a:blip r:embed="rId3">
+            <a:extLst>
+              <a:ext uri="{28A0092B-C50C-407E-A947-70E740481C1C}">
+                <a14:useLocalDpi xmlns:a14="http://schemas.microsoft.com/office/drawing/2010/main" val="0"/>
+              </a:ext>
+            </a:extLst>
+          </a:blip>
+          <a:stretch>
+            <a:fillRect/>
+          </a:stretch>
+        </p:blipFill>
+        <p:spPr>
+          <a:xfrm>
+            <a:off x="3014152" y="1329114"/>
+            <a:ext cx="6163694" cy="4199772"/>
+          </a:xfrm>
+          <a:prstGeom prst="rect">
+            <a:avLst/>
+          </a:prstGeom>
+        </p:spPr>
+      </p:pic>
+    </p:spTree>
+    <p:extLst>
+      <p:ext uri="{BB962C8B-B14F-4D97-AF65-F5344CB8AC3E}">
+        <p14:creationId xmlns:p14="http://schemas.microsoft.com/office/powerpoint/2010/main" val="2550920875"/>
+      </p:ext>
+    </p:extLst>
+  </p:cSld>
+  <p:clrMapOvr>
+    <a:masterClrMapping/>
+  </p:clrMapOvr>
+</p:sld>
+</file>
+
 <file path=ppt/theme/theme1.xml><?xml version="1.0" encoding="utf-8"?>
 <a:theme xmlns:a="http://schemas.openxmlformats.org/drawingml/2006/main" name="Office Theme">
   <a:themeElements>

</xml_diff>